<commit_message>
Updated repo url to mine for the time being
</commit_message>
<xml_diff>
--- a/Linux_slides.pptx
+++ b/Linux_slides.pptx
@@ -3462,98 +3462,106 @@
           <a:lstStyle/>
           <a:p>
             <a:r>
-              <a:rPr lang="en-US" dirty="0" err="1"/>
-              <a:t>url</a:t>
-            </a:r>
-            <a:r>
               <a:rPr lang="en-US" dirty="0"/>
-              <a:t> to be updated</a:t>
-            </a:r>
-          </a:p>
-          <a:p>
-            <a:pPr lvl="1"/>
-            <a:r>
-              <a:rPr lang="en-US" dirty="0"/>
-              <a:t>git clone </a:t>
-            </a:r>
-            <a:r>
-              <a:rPr lang="en-US" dirty="0" err="1"/>
-              <a:t>url</a:t>
-            </a:r>
-            <a:endParaRPr lang="en-US" dirty="0"/>
-          </a:p>
-          <a:p>
-            <a:r>
-              <a:rPr lang="en-US" dirty="0"/>
-              <a:t>Find </a:t>
-            </a:r>
-            <a:r>
-              <a:rPr lang="en-US" dirty="0" err="1"/>
-              <a:t>linux</a:t>
-            </a:r>
-            <a:r>
-              <a:rPr lang="en-US" dirty="0"/>
-              <a:t> command line to follow along</a:t>
-            </a:r>
-          </a:p>
-          <a:p>
-            <a:pPr lvl="1"/>
-            <a:r>
-              <a:rPr lang="en-US" dirty="0"/>
-              <a:t>ICS servers – uci_net_id@openlab.ics.uci.edu </a:t>
-            </a:r>
-          </a:p>
-          <a:p>
-            <a:pPr lvl="2"/>
-            <a:r>
-              <a:rPr lang="en-US" dirty="0"/>
-              <a:t>Sign in with ICS username/password</a:t>
-            </a:r>
-          </a:p>
-          <a:p>
-            <a:pPr lvl="1"/>
-            <a:r>
-              <a:rPr lang="en-US" dirty="0"/>
-              <a:t>EECS servers </a:t>
-            </a:r>
-            <a:r>
-              <a:rPr lang="en-US" dirty="0" err="1"/>
-              <a:t>uci_net_net_id</a:t>
-            </a:r>
-            <a:r>
-              <a:rPr lang="en-US" dirty="0"/>
-              <a:t>@[bondi,crystalcove,laguna,zuma].eecs.uci.edu</a:t>
-            </a:r>
-          </a:p>
-          <a:p>
-            <a:pPr lvl="2"/>
-            <a:r>
-              <a:rPr lang="en-US" dirty="0"/>
-              <a:t>Sign in UCI Net username/password (what gets you into Canvas)</a:t>
-            </a:r>
-          </a:p>
-          <a:p>
-            <a:pPr lvl="1"/>
-            <a:r>
-              <a:rPr lang="en-US" dirty="0"/>
-              <a:t>Windows – download WSL/Ubuntu Shell</a:t>
-            </a:r>
-          </a:p>
-          <a:p>
-            <a:pPr lvl="2"/>
+              <a:t>Repo: </a:t>
+            </a:r>
             <a:r>
               <a:rPr lang="en-US" dirty="0">
                 <a:hlinkClick r:id="rId2"/>
               </a:rPr>
-              <a:t>https://docs.microsoft.com/en-us/windows/wsl/install</a:t>
+              <a:t>https://github.com/ValenYamamoto/IEEE_Linux_Workshop</a:t>
+            </a:r>
+            <a:r>
+              <a:rPr lang="en-US" dirty="0"/>
+              <a:t> </a:t>
+            </a:r>
+          </a:p>
+          <a:p>
+            <a:pPr lvl="1"/>
+            <a:r>
+              <a:rPr lang="en-US" dirty="0"/>
+              <a:t>git clone </a:t>
+            </a:r>
+            <a:r>
+              <a:rPr lang="en-US" dirty="0">
+                <a:hlinkClick r:id="rId2"/>
+              </a:rPr>
+              <a:t>https://github.com/ValenYamamoto/IEEE_Linux_Workshop</a:t>
             </a:r>
             <a:endParaRPr lang="en-US" dirty="0"/>
+          </a:p>
+          <a:p>
+            <a:r>
+              <a:rPr lang="en-US" dirty="0"/>
+              <a:t>Find </a:t>
+            </a:r>
+            <a:r>
+              <a:rPr lang="en-US" dirty="0" err="1"/>
+              <a:t>linux</a:t>
+            </a:r>
+            <a:r>
+              <a:rPr lang="en-US" dirty="0"/>
+              <a:t> command line to follow along</a:t>
+            </a:r>
+          </a:p>
+          <a:p>
+            <a:pPr lvl="1"/>
+            <a:r>
+              <a:rPr lang="en-US" dirty="0"/>
+              <a:t>ICS servers – uci_net_id@openlab.ics.uci.edu </a:t>
+            </a:r>
+          </a:p>
+          <a:p>
+            <a:pPr lvl="2"/>
+            <a:r>
+              <a:rPr lang="en-US" dirty="0"/>
+              <a:t>Sign in with ICS username/password</a:t>
+            </a:r>
+          </a:p>
+          <a:p>
+            <a:pPr lvl="1"/>
+            <a:r>
+              <a:rPr lang="en-US" dirty="0"/>
+              <a:t>EECS servers </a:t>
+            </a:r>
+            <a:r>
+              <a:rPr lang="en-US" dirty="0" err="1"/>
+              <a:t>uci_net_net_id</a:t>
+            </a:r>
+            <a:r>
+              <a:rPr lang="en-US" dirty="0"/>
+              <a:t>@[bondi,crystalcove,laguna,zuma].eecs.uci.edu</a:t>
+            </a:r>
+          </a:p>
+          <a:p>
+            <a:pPr lvl="2"/>
+            <a:r>
+              <a:rPr lang="en-US" dirty="0"/>
+              <a:t>Sign in UCI Net username/password (what gets you into Canvas)</a:t>
+            </a:r>
+          </a:p>
+          <a:p>
+            <a:pPr lvl="1"/>
+            <a:r>
+              <a:rPr lang="en-US" dirty="0"/>
+              <a:t>Windows – download WSL/Ubuntu Shell</a:t>
+            </a:r>
           </a:p>
           <a:p>
             <a:pPr lvl="2"/>
             <a:r>
               <a:rPr lang="en-US" dirty="0">
                 <a:hlinkClick r:id="rId3"/>
+              </a:rPr>
+              <a:t>https://docs.microsoft.com/en-us/windows/wsl/install</a:t>
+            </a:r>
+            <a:endParaRPr lang="en-US" dirty="0"/>
+          </a:p>
+          <a:p>
+            <a:pPr lvl="2"/>
+            <a:r>
+              <a:rPr lang="en-US" dirty="0">
+                <a:hlinkClick r:id="rId4"/>
               </a:rPr>
               <a:t>https://www.microsoft.com/en-us/p/ubuntu/9nblggh4msv6?activetab=pivot:overviewtab</a:t>
             </a:r>

</xml_diff>